<commit_message>
Fixed a minor blemish on a diagram.
</commit_message>
<xml_diff>
--- a/grpc-pubsub-azservicebus/Thinking Outside the Dapr-Mesh with Dapr, gRPC.pptx
+++ b/grpc-pubsub-azservicebus/Thinking Outside the Dapr-Mesh with Dapr, gRPC.pptx
@@ -338,7 +338,7 @@
           <a:p>
             <a:fld id="{CFC37855-D03C-49F4-B68F-729DF42794A3}" type="datetimeFigureOut">
               <a:rPr lang="en-US" smtClean="0"/>
-              <a:t>3/23/2021</a:t>
+              <a:t>3/29/2021</a:t>
             </a:fld>
             <a:endParaRPr lang="en-US"/>
           </a:p>
@@ -691,7 +691,7 @@
           <a:p>
             <a:fld id="{CFC37855-D03C-49F4-B68F-729DF42794A3}" type="datetimeFigureOut">
               <a:rPr lang="en-US" smtClean="0"/>
-              <a:t>3/23/2021</a:t>
+              <a:t>3/29/2021</a:t>
             </a:fld>
             <a:endParaRPr lang="en-US"/>
           </a:p>
@@ -866,7 +866,7 @@
           <a:p>
             <a:fld id="{CFC37855-D03C-49F4-B68F-729DF42794A3}" type="datetimeFigureOut">
               <a:rPr lang="en-US" smtClean="0"/>
-              <a:t>3/23/2021</a:t>
+              <a:t>3/29/2021</a:t>
             </a:fld>
             <a:endParaRPr lang="en-US"/>
           </a:p>
@@ -1039,7 +1039,7 @@
               <a:pPr>
                 <a:defRPr/>
               </a:pPr>
-              <a:t>3/23/2021</a:t>
+              <a:t>3/29/2021</a:t>
             </a:fld>
             <a:endParaRPr lang="en-US"/>
           </a:p>
@@ -1174,7 +1174,7 @@
           <a:p>
             <a:fld id="{CFC37855-D03C-49F4-B68F-729DF42794A3}" type="datetimeFigureOut">
               <a:rPr lang="en-US" smtClean="0"/>
-              <a:t>3/23/2021</a:t>
+              <a:t>3/29/2021</a:t>
             </a:fld>
             <a:endParaRPr lang="en-US"/>
           </a:p>
@@ -1532,7 +1532,7 @@
           <a:p>
             <a:fld id="{CFC37855-D03C-49F4-B68F-729DF42794A3}" type="datetimeFigureOut">
               <a:rPr lang="en-US" smtClean="0"/>
-              <a:t>3/23/2021</a:t>
+              <a:t>3/29/2021</a:t>
             </a:fld>
             <a:endParaRPr lang="en-US"/>
           </a:p>
@@ -1797,7 +1797,7 @@
           <a:p>
             <a:fld id="{CFC37855-D03C-49F4-B68F-729DF42794A3}" type="datetimeFigureOut">
               <a:rPr lang="en-US" smtClean="0"/>
-              <a:t>3/23/2021</a:t>
+              <a:t>3/29/2021</a:t>
             </a:fld>
             <a:endParaRPr lang="en-US"/>
           </a:p>
@@ -2159,7 +2159,7 @@
           <a:p>
             <a:fld id="{CFC37855-D03C-49F4-B68F-729DF42794A3}" type="datetimeFigureOut">
               <a:rPr lang="en-US" smtClean="0"/>
-              <a:t>3/23/2021</a:t>
+              <a:t>3/29/2021</a:t>
             </a:fld>
             <a:endParaRPr lang="en-US"/>
           </a:p>
@@ -2386,7 +2386,7 @@
           <a:p>
             <a:fld id="{CFC37855-D03C-49F4-B68F-729DF42794A3}" type="datetimeFigureOut">
               <a:rPr lang="en-US" smtClean="0"/>
-              <a:t>3/23/2021</a:t>
+              <a:t>3/29/2021</a:t>
             </a:fld>
             <a:endParaRPr lang="en-US"/>
           </a:p>
@@ -2476,7 +2476,7 @@
           <a:p>
             <a:fld id="{CFC37855-D03C-49F4-B68F-729DF42794A3}" type="datetimeFigureOut">
               <a:rPr lang="en-US" smtClean="0"/>
-              <a:t>3/23/2021</a:t>
+              <a:t>3/29/2021</a:t>
             </a:fld>
             <a:endParaRPr lang="en-US"/>
           </a:p>
@@ -2743,7 +2743,7 @@
           <a:p>
             <a:fld id="{CFC37855-D03C-49F4-B68F-729DF42794A3}" type="datetimeFigureOut">
               <a:rPr lang="en-US" smtClean="0"/>
-              <a:t>3/23/2021</a:t>
+              <a:t>3/29/2021</a:t>
             </a:fld>
             <a:endParaRPr lang="en-US"/>
           </a:p>
@@ -2971,7 +2971,7 @@
           <a:p>
             <a:fld id="{CFC37855-D03C-49F4-B68F-729DF42794A3}" type="datetimeFigureOut">
               <a:rPr lang="en-US" smtClean="0"/>
-              <a:t>3/23/2021</a:t>
+              <a:t>3/29/2021</a:t>
             </a:fld>
             <a:endParaRPr lang="en-US"/>
           </a:p>
@@ -3470,7 +3470,7 @@
           <a:p>
             <a:fld id="{CFC37855-D03C-49F4-B68F-729DF42794A3}" type="datetimeFigureOut">
               <a:rPr lang="en-US" smtClean="0"/>
-              <a:t>3/23/2021</a:t>
+              <a:t>3/29/2021</a:t>
             </a:fld>
             <a:endParaRPr lang="en-US"/>
           </a:p>
@@ -6140,7 +6140,7 @@
         </p:nvSpPr>
         <p:spPr>
           <a:xfrm>
-            <a:off x="918528" y="4994275"/>
+            <a:off x="918528" y="5029200"/>
             <a:ext cx="902335" cy="228600"/>
           </a:xfrm>
           <a:prstGeom prst="rect">

</xml_diff>

<commit_message>
Inserted missing ellipises on the right hand Dapr-Mesh of the diagram of 2 Dapr-Meshes.
</commit_message>
<xml_diff>
--- a/grpc-pubsub-azservicebus/Thinking Outside the Dapr-Mesh with Dapr, gRPC.pptx
+++ b/grpc-pubsub-azservicebus/Thinking Outside the Dapr-Mesh with Dapr, gRPC.pptx
@@ -338,7 +338,7 @@
           <a:p>
             <a:fld id="{CFC37855-D03C-49F4-B68F-729DF42794A3}" type="datetimeFigureOut">
               <a:rPr lang="en-US" smtClean="0"/>
-              <a:t>3/29/2021</a:t>
+              <a:t>4/4/2021</a:t>
             </a:fld>
             <a:endParaRPr lang="en-US"/>
           </a:p>
@@ -691,7 +691,7 @@
           <a:p>
             <a:fld id="{CFC37855-D03C-49F4-B68F-729DF42794A3}" type="datetimeFigureOut">
               <a:rPr lang="en-US" smtClean="0"/>
-              <a:t>3/29/2021</a:t>
+              <a:t>4/4/2021</a:t>
             </a:fld>
             <a:endParaRPr lang="en-US"/>
           </a:p>
@@ -866,7 +866,7 @@
           <a:p>
             <a:fld id="{CFC37855-D03C-49F4-B68F-729DF42794A3}" type="datetimeFigureOut">
               <a:rPr lang="en-US" smtClean="0"/>
-              <a:t>3/29/2021</a:t>
+              <a:t>4/4/2021</a:t>
             </a:fld>
             <a:endParaRPr lang="en-US"/>
           </a:p>
@@ -1039,7 +1039,7 @@
               <a:pPr>
                 <a:defRPr/>
               </a:pPr>
-              <a:t>3/29/2021</a:t>
+              <a:t>4/4/2021</a:t>
             </a:fld>
             <a:endParaRPr lang="en-US"/>
           </a:p>
@@ -1174,7 +1174,7 @@
           <a:p>
             <a:fld id="{CFC37855-D03C-49F4-B68F-729DF42794A3}" type="datetimeFigureOut">
               <a:rPr lang="en-US" smtClean="0"/>
-              <a:t>3/29/2021</a:t>
+              <a:t>4/4/2021</a:t>
             </a:fld>
             <a:endParaRPr lang="en-US"/>
           </a:p>
@@ -1532,7 +1532,7 @@
           <a:p>
             <a:fld id="{CFC37855-D03C-49F4-B68F-729DF42794A3}" type="datetimeFigureOut">
               <a:rPr lang="en-US" smtClean="0"/>
-              <a:t>3/29/2021</a:t>
+              <a:t>4/4/2021</a:t>
             </a:fld>
             <a:endParaRPr lang="en-US"/>
           </a:p>
@@ -1797,7 +1797,7 @@
           <a:p>
             <a:fld id="{CFC37855-D03C-49F4-B68F-729DF42794A3}" type="datetimeFigureOut">
               <a:rPr lang="en-US" smtClean="0"/>
-              <a:t>3/29/2021</a:t>
+              <a:t>4/4/2021</a:t>
             </a:fld>
             <a:endParaRPr lang="en-US"/>
           </a:p>
@@ -2159,7 +2159,7 @@
           <a:p>
             <a:fld id="{CFC37855-D03C-49F4-B68F-729DF42794A3}" type="datetimeFigureOut">
               <a:rPr lang="en-US" smtClean="0"/>
-              <a:t>3/29/2021</a:t>
+              <a:t>4/4/2021</a:t>
             </a:fld>
             <a:endParaRPr lang="en-US"/>
           </a:p>
@@ -2386,7 +2386,7 @@
           <a:p>
             <a:fld id="{CFC37855-D03C-49F4-B68F-729DF42794A3}" type="datetimeFigureOut">
               <a:rPr lang="en-US" smtClean="0"/>
-              <a:t>3/29/2021</a:t>
+              <a:t>4/4/2021</a:t>
             </a:fld>
             <a:endParaRPr lang="en-US"/>
           </a:p>
@@ -2476,7 +2476,7 @@
           <a:p>
             <a:fld id="{CFC37855-D03C-49F4-B68F-729DF42794A3}" type="datetimeFigureOut">
               <a:rPr lang="en-US" smtClean="0"/>
-              <a:t>3/29/2021</a:t>
+              <a:t>4/4/2021</a:t>
             </a:fld>
             <a:endParaRPr lang="en-US"/>
           </a:p>
@@ -2743,7 +2743,7 @@
           <a:p>
             <a:fld id="{CFC37855-D03C-49F4-B68F-729DF42794A3}" type="datetimeFigureOut">
               <a:rPr lang="en-US" smtClean="0"/>
-              <a:t>3/29/2021</a:t>
+              <a:t>4/4/2021</a:t>
             </a:fld>
             <a:endParaRPr lang="en-US"/>
           </a:p>
@@ -2971,7 +2971,7 @@
           <a:p>
             <a:fld id="{CFC37855-D03C-49F4-B68F-729DF42794A3}" type="datetimeFigureOut">
               <a:rPr lang="en-US" smtClean="0"/>
-              <a:t>3/29/2021</a:t>
+              <a:t>4/4/2021</a:t>
             </a:fld>
             <a:endParaRPr lang="en-US"/>
           </a:p>
@@ -3470,7 +3470,7 @@
           <a:p>
             <a:fld id="{CFC37855-D03C-49F4-B68F-729DF42794A3}" type="datetimeFigureOut">
               <a:rPr lang="en-US" smtClean="0"/>
-              <a:t>3/29/2021</a:t>
+              <a:t>4/4/2021</a:t>
             </a:fld>
             <a:endParaRPr lang="en-US"/>
           </a:p>
@@ -6821,6 +6821,120 @@
           </a:fontRef>
         </p:style>
       </p:cxnSp>
+      <p:sp>
+        <p:nvSpPr>
+          <p:cNvPr id="37" name="Rectangle 36"/>
+          <p:cNvSpPr/>
+          <p:nvPr/>
+        </p:nvSpPr>
+        <p:spPr>
+          <a:xfrm>
+            <a:off x="2609850" y="3707606"/>
+            <a:ext cx="549275" cy="369888"/>
+          </a:xfrm>
+          <a:prstGeom prst="rect">
+            <a:avLst/>
+          </a:prstGeom>
+          <a:solidFill>
+            <a:schemeClr val="bg1"/>
+          </a:solidFill>
+          <a:ln w="12700">
+            <a:noFill/>
+          </a:ln>
+        </p:spPr>
+        <p:style>
+          <a:lnRef idx="2">
+            <a:schemeClr val="accent1">
+              <a:shade val="50000"/>
+            </a:schemeClr>
+          </a:lnRef>
+          <a:fillRef idx="1">
+            <a:schemeClr val="accent1"/>
+          </a:fillRef>
+          <a:effectRef idx="0">
+            <a:schemeClr val="accent1"/>
+          </a:effectRef>
+          <a:fontRef idx="minor">
+            <a:schemeClr val="lt1"/>
+          </a:fontRef>
+        </p:style>
+        <p:txBody>
+          <a:bodyPr/>
+          <a:lstStyle/>
+          <a:p>
+            <a:pPr>
+              <a:defRPr/>
+            </a:pPr>
+            <a:r>
+              <a:rPr lang="en-US" sz="1600" dirty="0">
+                <a:solidFill>
+                  <a:schemeClr val="tx1"/>
+                </a:solidFill>
+                <a:latin typeface="Arial" pitchFamily="34" charset="0"/>
+                <a:cs typeface="Arial" pitchFamily="34" charset="0"/>
+              </a:rPr>
+              <a:t>…..</a:t>
+            </a:r>
+          </a:p>
+        </p:txBody>
+      </p:sp>
+      <p:sp>
+        <p:nvSpPr>
+          <p:cNvPr id="38" name="Rectangle 37"/>
+          <p:cNvSpPr/>
+          <p:nvPr/>
+        </p:nvSpPr>
+        <p:spPr>
+          <a:xfrm>
+            <a:off x="2622550" y="4554696"/>
+            <a:ext cx="549275" cy="369888"/>
+          </a:xfrm>
+          <a:prstGeom prst="rect">
+            <a:avLst/>
+          </a:prstGeom>
+          <a:solidFill>
+            <a:schemeClr val="bg1"/>
+          </a:solidFill>
+          <a:ln w="12700">
+            <a:noFill/>
+          </a:ln>
+        </p:spPr>
+        <p:style>
+          <a:lnRef idx="2">
+            <a:schemeClr val="accent1">
+              <a:shade val="50000"/>
+            </a:schemeClr>
+          </a:lnRef>
+          <a:fillRef idx="1">
+            <a:schemeClr val="accent1"/>
+          </a:fillRef>
+          <a:effectRef idx="0">
+            <a:schemeClr val="accent1"/>
+          </a:effectRef>
+          <a:fontRef idx="minor">
+            <a:schemeClr val="lt1"/>
+          </a:fontRef>
+        </p:style>
+        <p:txBody>
+          <a:bodyPr/>
+          <a:lstStyle/>
+          <a:p>
+            <a:pPr>
+              <a:defRPr/>
+            </a:pPr>
+            <a:r>
+              <a:rPr lang="en-US" sz="1600" dirty="0">
+                <a:solidFill>
+                  <a:schemeClr val="tx1"/>
+                </a:solidFill>
+                <a:latin typeface="Arial" pitchFamily="34" charset="0"/>
+                <a:cs typeface="Arial" pitchFamily="34" charset="0"/>
+              </a:rPr>
+              <a:t>…..</a:t>
+            </a:r>
+          </a:p>
+        </p:txBody>
+      </p:sp>
     </p:spTree>
     <p:extLst>
       <p:ext uri="{BB962C8B-B14F-4D97-AF65-F5344CB8AC3E}">

</xml_diff>